<commit_message>
first pass over cloud ch
</commit_message>
<xml_diff>
--- a/figures/ops/figures.pptx
+++ b/figures/ops/figures.pptx
@@ -2919,7 +2919,7 @@
           <a:p>
             <a:fld id="{BF4F8DC3-0006-B147-AA6D-FF436E850004}" type="datetimeFigureOut">
               <a:rPr lang="en-US" smtClean="0"/>
-              <a:t>7/29/22</a:t>
+              <a:t>8/16/22</a:t>
             </a:fld>
             <a:endParaRPr lang="en-US"/>
           </a:p>
@@ -10842,525 +10842,171 @@
           <a:chExt cx="0" cy="0"/>
         </a:xfrm>
       </p:grpSpPr>
+      <p:grpSp>
+        <p:nvGrpSpPr>
+          <p:cNvPr id="2" name="Group 1">
+            <a:extLst>
+              <a:ext uri="{FF2B5EF4-FFF2-40B4-BE49-F238E27FC236}">
+                <a16:creationId xmlns:a16="http://schemas.microsoft.com/office/drawing/2014/main" id="{02253DEA-E28B-C85C-0085-BFA7FEA3D83D}"/>
+              </a:ext>
+            </a:extLst>
+          </p:cNvPr>
+          <p:cNvGrpSpPr/>
+          <p:nvPr/>
+        </p:nvGrpSpPr>
+        <p:grpSpPr>
+          <a:xfrm>
+            <a:off x="4700074" y="2050919"/>
+            <a:ext cx="2718615" cy="1711816"/>
+            <a:chOff x="4680288" y="2251153"/>
+            <a:chExt cx="2718615" cy="1711816"/>
+          </a:xfrm>
+        </p:grpSpPr>
+        <p:sp>
+          <p:nvSpPr>
+            <p:cNvPr id="7" name="Cloud 6">
+              <a:extLst>
+                <a:ext uri="{FF2B5EF4-FFF2-40B4-BE49-F238E27FC236}">
+                  <a16:creationId xmlns:a16="http://schemas.microsoft.com/office/drawing/2014/main" id="{7024A5C5-5378-6361-E345-2EA3B206D4AC}"/>
+                </a:ext>
+              </a:extLst>
+            </p:cNvPr>
+            <p:cNvSpPr/>
+            <p:nvPr/>
+          </p:nvSpPr>
+          <p:spPr>
+            <a:xfrm>
+              <a:off x="4680288" y="3084872"/>
+              <a:ext cx="2718615" cy="878097"/>
+            </a:xfrm>
+            <a:prstGeom prst="cloud">
+              <a:avLst/>
+            </a:prstGeom>
+            <a:solidFill>
+              <a:schemeClr val="bg1">
+                <a:lumMod val="65000"/>
+              </a:schemeClr>
+            </a:solidFill>
+            <a:ln w="9525">
+              <a:solidFill>
+                <a:srgbClr val="6A99D0"/>
+              </a:solidFill>
+            </a:ln>
+          </p:spPr>
+          <p:style>
+            <a:lnRef idx="2">
+              <a:schemeClr val="accent1">
+                <a:shade val="50000"/>
+              </a:schemeClr>
+            </a:lnRef>
+            <a:fillRef idx="1">
+              <a:schemeClr val="accent1"/>
+            </a:fillRef>
+            <a:effectRef idx="0">
+              <a:schemeClr val="accent1"/>
+            </a:effectRef>
+            <a:fontRef idx="minor">
+              <a:schemeClr val="lt1"/>
+            </a:fontRef>
+          </p:style>
+          <p:txBody>
+            <a:bodyPr rtlCol="0" anchor="ctr"/>
+            <a:lstStyle/>
+            <a:p>
+              <a:pPr algn="ctr"/>
+              <a:r>
+                <a:rPr lang="en-US" sz="1600" dirty="0">
+                  <a:latin typeface="Calibri" charset="0"/>
+                  <a:ea typeface="Calibri" charset="0"/>
+                  <a:cs typeface="Calibri" charset="0"/>
+                </a:rPr>
+                <a:t>Physical Hardware</a:t>
+              </a:r>
+            </a:p>
+          </p:txBody>
+        </p:sp>
+        <p:sp>
+          <p:nvSpPr>
+            <p:cNvPr id="9" name="Rounded Rectangle 8">
+              <a:extLst>
+                <a:ext uri="{FF2B5EF4-FFF2-40B4-BE49-F238E27FC236}">
+                  <a16:creationId xmlns:a16="http://schemas.microsoft.com/office/drawing/2014/main" id="{AEC3C09B-E34C-A073-89E0-9F4DB68E3A83}"/>
+                </a:ext>
+              </a:extLst>
+            </p:cNvPr>
+            <p:cNvSpPr/>
+            <p:nvPr/>
+          </p:nvSpPr>
+          <p:spPr>
+            <a:xfrm>
+              <a:off x="4680288" y="2251153"/>
+              <a:ext cx="2718614" cy="1004048"/>
+            </a:xfrm>
+            <a:prstGeom prst="roundRect">
+              <a:avLst>
+                <a:gd name="adj" fmla="val 11093"/>
+              </a:avLst>
+            </a:prstGeom>
+            <a:solidFill>
+              <a:schemeClr val="accent1">
+                <a:lumMod val="20000"/>
+                <a:lumOff val="80000"/>
+              </a:schemeClr>
+            </a:solidFill>
+            <a:ln>
+              <a:noFill/>
+            </a:ln>
+          </p:spPr>
+          <p:style>
+            <a:lnRef idx="1">
+              <a:schemeClr val="accent1"/>
+            </a:lnRef>
+            <a:fillRef idx="2">
+              <a:schemeClr val="accent1"/>
+            </a:fillRef>
+            <a:effectRef idx="1">
+              <a:schemeClr val="accent1"/>
+            </a:effectRef>
+            <a:fontRef idx="minor">
+              <a:schemeClr val="dk1"/>
+            </a:fontRef>
+          </p:style>
+          <p:txBody>
+            <a:bodyPr rtlCol="0" anchor="ctr"/>
+            <a:lstStyle/>
+            <a:p>
+              <a:pPr algn="ctr"/>
+              <a:endParaRPr lang="en-US" dirty="0"/>
+            </a:p>
+            <a:p>
+              <a:pPr algn="ctr"/>
+              <a:r>
+                <a:rPr lang="en-US" i="1" dirty="0">
+                  <a:latin typeface="Calibri" panose="020F0502020204030204" pitchFamily="34" charset="0"/>
+                  <a:cs typeface="Calibri" panose="020F0502020204030204" pitchFamily="34" charset="0"/>
+                </a:rPr>
+                <a:t>Bootstrap tooling to bring a cluster into the “ready” state.</a:t>
+              </a:r>
+            </a:p>
+          </p:txBody>
+        </p:sp>
+      </p:grpSp>
       <p:sp>
         <p:nvSpPr>
-          <p:cNvPr id="91" name="Google Shape;282;p25"/>
+          <p:cNvPr id="12" name="Cloud 11">
+            <a:extLst>
+              <a:ext uri="{FF2B5EF4-FFF2-40B4-BE49-F238E27FC236}">
+                <a16:creationId xmlns:a16="http://schemas.microsoft.com/office/drawing/2014/main" id="{EB7DB971-0529-3A45-B191-9DCC3360A877}"/>
+              </a:ext>
+            </a:extLst>
+          </p:cNvPr>
           <p:cNvSpPr/>
           <p:nvPr/>
         </p:nvSpPr>
         <p:spPr>
           <a:xfrm>
-            <a:off x="2989375" y="1983757"/>
-            <a:ext cx="1101858" cy="755401"/>
-          </a:xfrm>
-          <a:prstGeom prst="roundRect">
-            <a:avLst>
-              <a:gd name="adj" fmla="val 16667"/>
-            </a:avLst>
-          </a:prstGeom>
-          <a:solidFill>
-            <a:schemeClr val="tx1">
-              <a:lumMod val="20000"/>
-              <a:lumOff val="80000"/>
-            </a:schemeClr>
-          </a:solidFill>
-          <a:ln w="9525" cap="flat" cmpd="sng">
-            <a:solidFill>
-              <a:srgbClr val="6A99D0"/>
-            </a:solidFill>
-            <a:prstDash val="solid"/>
-            <a:round/>
-            <a:headEnd type="none" w="sm" len="sm"/>
-            <a:tailEnd type="none" w="sm" len="sm"/>
-          </a:ln>
-          <a:effectLst>
-            <a:outerShdw blurRad="50800" dist="38100" dir="2700000" algn="tl" rotWithShape="0">
-              <a:prstClr val="black">
-                <a:alpha val="40000"/>
-              </a:prstClr>
-            </a:outerShdw>
-          </a:effectLst>
-        </p:spPr>
-        <p:txBody>
-          <a:bodyPr spcFirstLastPara="1" wrap="square" lIns="121900" tIns="121900" rIns="121900" bIns="121900" anchor="ctr" anchorCtr="0">
-            <a:noAutofit/>
-          </a:bodyPr>
-          <a:lstStyle/>
-          <a:p>
-            <a:pPr algn="ctr"/>
-            <a:r>
-              <a:rPr lang="en-US" sz="1200" dirty="0">
-                <a:latin typeface="Calibri" panose="020F0502020204030204" pitchFamily="34" charset="0"/>
-                <a:cs typeface="Calibri" panose="020F0502020204030204" pitchFamily="34" charset="0"/>
-              </a:rPr>
-              <a:t>Continuous Integration</a:t>
-            </a:r>
-            <a:endParaRPr sz="1200" dirty="0">
-              <a:solidFill>
-                <a:srgbClr val="000000"/>
-              </a:solidFill>
-              <a:latin typeface="Calibri" panose="020F0502020204030204" pitchFamily="34" charset="0"/>
-              <a:cs typeface="Calibri" panose="020F0502020204030204" pitchFamily="34" charset="0"/>
-            </a:endParaRPr>
-          </a:p>
-        </p:txBody>
-      </p:sp>
-      <p:sp>
-        <p:nvSpPr>
-          <p:cNvPr id="92" name="Google Shape;259;p25"/>
-          <p:cNvSpPr/>
-          <p:nvPr/>
-        </p:nvSpPr>
-        <p:spPr>
-          <a:xfrm>
-            <a:off x="4504077" y="1983757"/>
-            <a:ext cx="831494" cy="755402"/>
-          </a:xfrm>
-          <a:prstGeom prst="can">
-            <a:avLst>
-              <a:gd name="adj" fmla="val 25000"/>
-            </a:avLst>
-          </a:prstGeom>
-          <a:solidFill>
-            <a:schemeClr val="bg1">
-              <a:lumMod val="65000"/>
-            </a:schemeClr>
-          </a:solidFill>
-          <a:ln w="9525" cap="flat" cmpd="sng">
-            <a:solidFill>
-              <a:srgbClr val="6A99D0"/>
-            </a:solidFill>
-            <a:prstDash val="solid"/>
-            <a:round/>
-            <a:headEnd type="none" w="sm" len="sm"/>
-            <a:tailEnd type="none" w="sm" len="sm"/>
-          </a:ln>
-          <a:effectLst>
-            <a:outerShdw blurRad="50800" dist="38100" dir="2700000" algn="tl" rotWithShape="0">
-              <a:prstClr val="black">
-                <a:alpha val="40000"/>
-              </a:prstClr>
-            </a:outerShdw>
-          </a:effectLst>
-        </p:spPr>
-        <p:txBody>
-          <a:bodyPr spcFirstLastPara="1" wrap="square" lIns="121900" tIns="121900" rIns="121900" bIns="121900" anchor="ctr" anchorCtr="0">
-            <a:noAutofit/>
-          </a:bodyPr>
-          <a:lstStyle/>
-          <a:p>
-            <a:pPr algn="ctr">
-              <a:lnSpc>
-                <a:spcPct val="90000"/>
-              </a:lnSpc>
-            </a:pPr>
-            <a:r>
-              <a:rPr lang="en-US" sz="1200" dirty="0">
-                <a:solidFill>
-                  <a:schemeClr val="bg1"/>
-                </a:solidFill>
-                <a:latin typeface="Calibri" panose="020F0502020204030204" pitchFamily="34" charset="0"/>
-                <a:cs typeface="Calibri" panose="020F0502020204030204" pitchFamily="34" charset="0"/>
-              </a:rPr>
-              <a:t>Image</a:t>
-            </a:r>
-            <a:endParaRPr sz="1200" dirty="0">
-              <a:solidFill>
-                <a:schemeClr val="bg1"/>
-              </a:solidFill>
-              <a:latin typeface="Calibri" panose="020F0502020204030204" pitchFamily="34" charset="0"/>
-              <a:cs typeface="Calibri" panose="020F0502020204030204" pitchFamily="34" charset="0"/>
-            </a:endParaRPr>
-          </a:p>
-          <a:p>
-            <a:pPr algn="ctr">
-              <a:lnSpc>
-                <a:spcPct val="90000"/>
-              </a:lnSpc>
-            </a:pPr>
-            <a:r>
-              <a:rPr lang="en" sz="1200" dirty="0">
-                <a:solidFill>
-                  <a:schemeClr val="bg1"/>
-                </a:solidFill>
-                <a:latin typeface="Calibri" panose="020F0502020204030204" pitchFamily="34" charset="0"/>
-                <a:cs typeface="Calibri" panose="020F0502020204030204" pitchFamily="34" charset="0"/>
-              </a:rPr>
-              <a:t>Repo</a:t>
-            </a:r>
-            <a:endParaRPr sz="1200" dirty="0">
-              <a:solidFill>
-                <a:schemeClr val="bg1"/>
-              </a:solidFill>
-              <a:latin typeface="Calibri" panose="020F0502020204030204" pitchFamily="34" charset="0"/>
-              <a:cs typeface="Calibri" panose="020F0502020204030204" pitchFamily="34" charset="0"/>
-            </a:endParaRPr>
-          </a:p>
-        </p:txBody>
-      </p:sp>
-      <p:sp>
-        <p:nvSpPr>
-          <p:cNvPr id="93" name="Google Shape;259;p25"/>
-          <p:cNvSpPr/>
-          <p:nvPr/>
-        </p:nvSpPr>
-        <p:spPr>
-          <a:xfrm>
-            <a:off x="1745037" y="1983756"/>
-            <a:ext cx="831494" cy="755402"/>
-          </a:xfrm>
-          <a:prstGeom prst="can">
-            <a:avLst>
-              <a:gd name="adj" fmla="val 25000"/>
-            </a:avLst>
-          </a:prstGeom>
-          <a:solidFill>
-            <a:schemeClr val="bg1">
-              <a:lumMod val="65000"/>
-            </a:schemeClr>
-          </a:solidFill>
-          <a:ln w="9525" cap="flat" cmpd="sng">
-            <a:solidFill>
-              <a:srgbClr val="6A99D0"/>
-            </a:solidFill>
-            <a:prstDash val="solid"/>
-            <a:round/>
-            <a:headEnd type="none" w="sm" len="sm"/>
-            <a:tailEnd type="none" w="sm" len="sm"/>
-          </a:ln>
-          <a:effectLst>
-            <a:outerShdw blurRad="50800" dist="38100" dir="2700000" algn="tl" rotWithShape="0">
-              <a:prstClr val="black">
-                <a:alpha val="40000"/>
-              </a:prstClr>
-            </a:outerShdw>
-          </a:effectLst>
-        </p:spPr>
-        <p:txBody>
-          <a:bodyPr spcFirstLastPara="1" wrap="square" lIns="121900" tIns="121900" rIns="121900" bIns="121900" anchor="ctr" anchorCtr="0">
-            <a:noAutofit/>
-          </a:bodyPr>
-          <a:lstStyle/>
-          <a:p>
-            <a:pPr algn="ctr">
-              <a:lnSpc>
-                <a:spcPct val="90000"/>
-              </a:lnSpc>
-            </a:pPr>
-            <a:r>
-              <a:rPr lang="en-US" sz="1200" dirty="0">
-                <a:solidFill>
-                  <a:schemeClr val="bg1"/>
-                </a:solidFill>
-                <a:latin typeface="Calibri" panose="020F0502020204030204" pitchFamily="34" charset="0"/>
-                <a:cs typeface="Calibri" panose="020F0502020204030204" pitchFamily="34" charset="0"/>
-              </a:rPr>
-              <a:t>Code</a:t>
-            </a:r>
-            <a:endParaRPr sz="1200" dirty="0">
-              <a:solidFill>
-                <a:schemeClr val="bg1"/>
-              </a:solidFill>
-              <a:latin typeface="Calibri" panose="020F0502020204030204" pitchFamily="34" charset="0"/>
-              <a:cs typeface="Calibri" panose="020F0502020204030204" pitchFamily="34" charset="0"/>
-            </a:endParaRPr>
-          </a:p>
-          <a:p>
-            <a:pPr algn="ctr">
-              <a:lnSpc>
-                <a:spcPct val="90000"/>
-              </a:lnSpc>
-            </a:pPr>
-            <a:r>
-              <a:rPr lang="en" sz="1200" dirty="0">
-                <a:solidFill>
-                  <a:schemeClr val="bg1"/>
-                </a:solidFill>
-                <a:latin typeface="Calibri" panose="020F0502020204030204" pitchFamily="34" charset="0"/>
-                <a:cs typeface="Calibri" panose="020F0502020204030204" pitchFamily="34" charset="0"/>
-              </a:rPr>
-              <a:t>Repo</a:t>
-            </a:r>
-            <a:endParaRPr sz="1200" dirty="0">
-              <a:solidFill>
-                <a:schemeClr val="bg1"/>
-              </a:solidFill>
-              <a:latin typeface="Calibri" panose="020F0502020204030204" pitchFamily="34" charset="0"/>
-              <a:cs typeface="Calibri" panose="020F0502020204030204" pitchFamily="34" charset="0"/>
-            </a:endParaRPr>
-          </a:p>
-        </p:txBody>
-      </p:sp>
-      <p:sp>
-        <p:nvSpPr>
-          <p:cNvPr id="94" name="Google Shape;282;p25"/>
-          <p:cNvSpPr/>
-          <p:nvPr/>
-        </p:nvSpPr>
-        <p:spPr>
-          <a:xfrm>
-            <a:off x="5748415" y="1983757"/>
-            <a:ext cx="1101858" cy="755401"/>
-          </a:xfrm>
-          <a:prstGeom prst="roundRect">
-            <a:avLst>
-              <a:gd name="adj" fmla="val 16667"/>
-            </a:avLst>
-          </a:prstGeom>
-          <a:solidFill>
-            <a:schemeClr val="tx1">
-              <a:lumMod val="20000"/>
-              <a:lumOff val="80000"/>
-            </a:schemeClr>
-          </a:solidFill>
-          <a:ln w="9525" cap="flat" cmpd="sng">
-            <a:solidFill>
-              <a:srgbClr val="6A99D0"/>
-            </a:solidFill>
-            <a:prstDash val="solid"/>
-            <a:round/>
-            <a:headEnd type="none" w="sm" len="sm"/>
-            <a:tailEnd type="none" w="sm" len="sm"/>
-          </a:ln>
-          <a:effectLst>
-            <a:outerShdw blurRad="50800" dist="38100" dir="2700000" algn="tl" rotWithShape="0">
-              <a:prstClr val="black">
-                <a:alpha val="40000"/>
-              </a:prstClr>
-            </a:outerShdw>
-          </a:effectLst>
-        </p:spPr>
-        <p:txBody>
-          <a:bodyPr spcFirstLastPara="1" wrap="square" lIns="121900" tIns="121900" rIns="121900" bIns="121900" anchor="ctr" anchorCtr="0">
-            <a:noAutofit/>
-          </a:bodyPr>
-          <a:lstStyle/>
-          <a:p>
-            <a:pPr algn="ctr"/>
-            <a:r>
-              <a:rPr lang="en-US" sz="1200" dirty="0">
-                <a:latin typeface="Calibri" panose="020F0502020204030204" pitchFamily="34" charset="0"/>
-                <a:cs typeface="Calibri" panose="020F0502020204030204" pitchFamily="34" charset="0"/>
-              </a:rPr>
-              <a:t>Continuous Deployment</a:t>
-            </a:r>
-            <a:endParaRPr sz="1200" dirty="0">
-              <a:solidFill>
-                <a:srgbClr val="000000"/>
-              </a:solidFill>
-              <a:latin typeface="Calibri" panose="020F0502020204030204" pitchFamily="34" charset="0"/>
-              <a:cs typeface="Calibri" panose="020F0502020204030204" pitchFamily="34" charset="0"/>
-            </a:endParaRPr>
-          </a:p>
-        </p:txBody>
-      </p:sp>
-      <p:cxnSp>
-        <p:nvCxnSpPr>
-          <p:cNvPr id="3" name="Straight Arrow Connector 2"/>
-          <p:cNvCxnSpPr>
-            <a:cxnSpLocks/>
-            <a:stCxn id="6" idx="3"/>
-            <a:endCxn id="93" idx="2"/>
-          </p:cNvCxnSpPr>
-          <p:nvPr/>
-        </p:nvCxnSpPr>
-        <p:spPr>
-          <a:xfrm>
-            <a:off x="1313232" y="2361457"/>
-            <a:ext cx="431805" cy="0"/>
-          </a:xfrm>
-          <a:prstGeom prst="straightConnector1">
-            <a:avLst/>
-          </a:prstGeom>
-          <a:ln>
-            <a:solidFill>
-              <a:srgbClr val="6A99D0"/>
-            </a:solidFill>
-            <a:tailEnd type="triangle"/>
-          </a:ln>
-        </p:spPr>
-        <p:style>
-          <a:lnRef idx="1">
-            <a:schemeClr val="accent1"/>
-          </a:lnRef>
-          <a:fillRef idx="0">
-            <a:schemeClr val="accent1"/>
-          </a:fillRef>
-          <a:effectRef idx="0">
-            <a:schemeClr val="accent1"/>
-          </a:effectRef>
-          <a:fontRef idx="minor">
-            <a:schemeClr val="tx1"/>
-          </a:fontRef>
-        </p:style>
-      </p:cxnSp>
-      <p:cxnSp>
-        <p:nvCxnSpPr>
-          <p:cNvPr id="5" name="Straight Arrow Connector 4"/>
-          <p:cNvCxnSpPr>
-            <a:stCxn id="93" idx="4"/>
-            <a:endCxn id="91" idx="1"/>
-          </p:cNvCxnSpPr>
-          <p:nvPr/>
-        </p:nvCxnSpPr>
-        <p:spPr>
-          <a:xfrm>
-            <a:off x="2576531" y="2361457"/>
-            <a:ext cx="412844" cy="1"/>
-          </a:xfrm>
-          <a:prstGeom prst="straightConnector1">
-            <a:avLst/>
-          </a:prstGeom>
-          <a:ln>
-            <a:solidFill>
-              <a:srgbClr val="6A99D0"/>
-            </a:solidFill>
-            <a:tailEnd type="triangle"/>
-          </a:ln>
-        </p:spPr>
-        <p:style>
-          <a:lnRef idx="1">
-            <a:schemeClr val="accent1"/>
-          </a:lnRef>
-          <a:fillRef idx="0">
-            <a:schemeClr val="accent1"/>
-          </a:fillRef>
-          <a:effectRef idx="0">
-            <a:schemeClr val="accent1"/>
-          </a:effectRef>
-          <a:fontRef idx="minor">
-            <a:schemeClr val="tx1"/>
-          </a:fontRef>
-        </p:style>
-      </p:cxnSp>
-      <p:cxnSp>
-        <p:nvCxnSpPr>
-          <p:cNvPr id="8" name="Straight Arrow Connector 7"/>
-          <p:cNvCxnSpPr>
-            <a:stCxn id="91" idx="3"/>
-            <a:endCxn id="92" idx="2"/>
-          </p:cNvCxnSpPr>
-          <p:nvPr/>
-        </p:nvCxnSpPr>
-        <p:spPr>
-          <a:xfrm>
-            <a:off x="4091233" y="2361458"/>
-            <a:ext cx="412844" cy="0"/>
-          </a:xfrm>
-          <a:prstGeom prst="straightConnector1">
-            <a:avLst/>
-          </a:prstGeom>
-          <a:ln>
-            <a:solidFill>
-              <a:srgbClr val="6A99D0"/>
-            </a:solidFill>
-            <a:tailEnd type="triangle"/>
-          </a:ln>
-        </p:spPr>
-        <p:style>
-          <a:lnRef idx="1">
-            <a:schemeClr val="accent1"/>
-          </a:lnRef>
-          <a:fillRef idx="0">
-            <a:schemeClr val="accent1"/>
-          </a:fillRef>
-          <a:effectRef idx="0">
-            <a:schemeClr val="accent1"/>
-          </a:effectRef>
-          <a:fontRef idx="minor">
-            <a:schemeClr val="tx1"/>
-          </a:fontRef>
-        </p:style>
-      </p:cxnSp>
-      <p:cxnSp>
-        <p:nvCxnSpPr>
-          <p:cNvPr id="11" name="Straight Arrow Connector 10"/>
-          <p:cNvCxnSpPr>
-            <a:stCxn id="92" idx="4"/>
-            <a:endCxn id="94" idx="1"/>
-          </p:cNvCxnSpPr>
-          <p:nvPr/>
-        </p:nvCxnSpPr>
-        <p:spPr>
-          <a:xfrm>
-            <a:off x="5335571" y="2361458"/>
-            <a:ext cx="412844" cy="0"/>
-          </a:xfrm>
-          <a:prstGeom prst="straightConnector1">
-            <a:avLst/>
-          </a:prstGeom>
-          <a:ln>
-            <a:solidFill>
-              <a:srgbClr val="6A99D0"/>
-            </a:solidFill>
-            <a:tailEnd type="triangle"/>
-          </a:ln>
-        </p:spPr>
-        <p:style>
-          <a:lnRef idx="1">
-            <a:schemeClr val="accent1"/>
-          </a:lnRef>
-          <a:fillRef idx="0">
-            <a:schemeClr val="accent1"/>
-          </a:fillRef>
-          <a:effectRef idx="0">
-            <a:schemeClr val="accent1"/>
-          </a:effectRef>
-          <a:fontRef idx="minor">
-            <a:schemeClr val="tx1"/>
-          </a:fontRef>
-        </p:style>
-      </p:cxnSp>
-      <p:cxnSp>
-        <p:nvCxnSpPr>
-          <p:cNvPr id="108" name="Straight Arrow Connector 107"/>
-          <p:cNvCxnSpPr>
-            <a:cxnSpLocks/>
-            <a:stCxn id="94" idx="3"/>
-            <a:endCxn id="18" idx="2"/>
-          </p:cNvCxnSpPr>
-          <p:nvPr/>
-        </p:nvCxnSpPr>
-        <p:spPr>
-          <a:xfrm flipV="1">
-            <a:off x="6850273" y="2361457"/>
-            <a:ext cx="417315" cy="1"/>
-          </a:xfrm>
-          <a:prstGeom prst="straightConnector1">
-            <a:avLst/>
-          </a:prstGeom>
-          <a:ln>
-            <a:solidFill>
-              <a:srgbClr val="6A99D0"/>
-            </a:solidFill>
-            <a:tailEnd type="triangle"/>
-          </a:ln>
-        </p:spPr>
-        <p:style>
-          <a:lnRef idx="1">
-            <a:schemeClr val="accent1"/>
-          </a:lnRef>
-          <a:fillRef idx="0">
-            <a:schemeClr val="accent1"/>
-          </a:fillRef>
-          <a:effectRef idx="0">
-            <a:schemeClr val="accent1"/>
-          </a:effectRef>
-          <a:fontRef idx="minor">
-            <a:schemeClr val="tx1"/>
-          </a:fontRef>
-        </p:style>
-      </p:cxnSp>
-      <p:sp>
-        <p:nvSpPr>
-          <p:cNvPr id="18" name="Cloud 17"/>
-          <p:cNvSpPr/>
-          <p:nvPr/>
-        </p:nvSpPr>
-        <p:spPr>
-          <a:xfrm>
-            <a:off x="7263116" y="1983756"/>
-            <a:ext cx="1441609" cy="755402"/>
+            <a:off x="1493342" y="2048719"/>
+            <a:ext cx="2718615" cy="1651261"/>
           </a:xfrm>
           <a:prstGeom prst="cloud">
             <a:avLst/>
@@ -11398,22 +11044,22 @@
           <a:p>
             <a:pPr algn="ctr"/>
             <a:r>
-              <a:rPr lang="en-US" sz="1200" dirty="0">
+              <a:rPr lang="en-US" sz="1600" dirty="0">
                 <a:latin typeface="Calibri" charset="0"/>
                 <a:ea typeface="Calibri" charset="0"/>
                 <a:cs typeface="Calibri" charset="0"/>
               </a:rPr>
-              <a:t>Operational Cloud</a:t>
+              <a:t>Commercial Cloud</a:t>
             </a:r>
           </a:p>
         </p:txBody>
       </p:sp>
       <p:sp>
         <p:nvSpPr>
-          <p:cNvPr id="13" name="Google Shape;259;p25">
+          <p:cNvPr id="14" name="Rounded Rectangle 13">
             <a:extLst>
               <a:ext uri="{FF2B5EF4-FFF2-40B4-BE49-F238E27FC236}">
-                <a16:creationId xmlns:a16="http://schemas.microsoft.com/office/drawing/2014/main" id="{19828FBE-E5C6-E946-947D-274D11CC6069}"/>
+                <a16:creationId xmlns:a16="http://schemas.microsoft.com/office/drawing/2014/main" id="{26E472CD-FB1B-A057-C67E-D9A0D237E637}"/>
               </a:ext>
             </a:extLst>
           </p:cNvPr>
@@ -11422,115 +11068,75 @@
         </p:nvSpPr>
         <p:spPr>
           <a:xfrm>
-            <a:off x="5883597" y="866697"/>
-            <a:ext cx="831494" cy="755402"/>
+            <a:off x="1493342" y="2050918"/>
+            <a:ext cx="2718614" cy="320597"/>
           </a:xfrm>
-          <a:prstGeom prst="can">
-            <a:avLst>
-              <a:gd name="adj" fmla="val 25000"/>
-            </a:avLst>
+          <a:prstGeom prst="roundRect">
+            <a:avLst/>
           </a:prstGeom>
-          <a:solidFill>
-            <a:schemeClr val="bg1">
-              <a:lumMod val="65000"/>
-            </a:schemeClr>
-          </a:solidFill>
-          <a:ln w="9525" cap="flat" cmpd="sng">
-            <a:solidFill>
-              <a:srgbClr val="6A99D0"/>
-            </a:solidFill>
-            <a:prstDash val="solid"/>
-            <a:round/>
-            <a:headEnd type="none" w="sm" len="sm"/>
-            <a:tailEnd type="none" w="sm" len="sm"/>
+          <a:ln w="28575">
+            <a:noFill/>
           </a:ln>
-          <a:effectLst>
-            <a:outerShdw blurRad="50800" dist="38100" dir="2700000" algn="tl" rotWithShape="0">
-              <a:prstClr val="black">
-                <a:alpha val="40000"/>
-              </a:prstClr>
-            </a:outerShdw>
-          </a:effectLst>
         </p:spPr>
+        <p:style>
+          <a:lnRef idx="3">
+            <a:schemeClr val="lt1"/>
+          </a:lnRef>
+          <a:fillRef idx="1">
+            <a:schemeClr val="accent1"/>
+          </a:fillRef>
+          <a:effectRef idx="1">
+            <a:schemeClr val="accent1"/>
+          </a:effectRef>
+          <a:fontRef idx="minor">
+            <a:schemeClr val="lt1"/>
+          </a:fontRef>
+        </p:style>
         <p:txBody>
-          <a:bodyPr spcFirstLastPara="1" wrap="square" lIns="121900" tIns="121900" rIns="121900" bIns="121900" anchor="ctr" anchorCtr="0">
-            <a:noAutofit/>
-          </a:bodyPr>
+          <a:bodyPr rtlCol="0" anchor="ctr"/>
           <a:lstStyle/>
           <a:p>
-            <a:pPr algn="ctr">
-              <a:lnSpc>
-                <a:spcPct val="90000"/>
-              </a:lnSpc>
-            </a:pPr>
+            <a:pPr algn="ctr"/>
             <a:r>
-              <a:rPr lang="en-US" sz="1200" dirty="0">
+              <a:rPr lang="en-US" dirty="0">
                 <a:solidFill>
                   <a:schemeClr val="bg1"/>
                 </a:solidFill>
                 <a:latin typeface="Calibri" panose="020F0502020204030204" pitchFamily="34" charset="0"/>
                 <a:cs typeface="Calibri" panose="020F0502020204030204" pitchFamily="34" charset="0"/>
               </a:rPr>
-              <a:t>Config</a:t>
+              <a:t>Provisioning API</a:t>
             </a:r>
-            <a:endParaRPr sz="1200" dirty="0">
-              <a:solidFill>
-                <a:schemeClr val="bg1"/>
-              </a:solidFill>
-              <a:latin typeface="Calibri" panose="020F0502020204030204" pitchFamily="34" charset="0"/>
-              <a:cs typeface="Calibri" panose="020F0502020204030204" pitchFamily="34" charset="0"/>
-            </a:endParaRPr>
-          </a:p>
-          <a:p>
-            <a:pPr algn="ctr">
-              <a:lnSpc>
-                <a:spcPct val="90000"/>
-              </a:lnSpc>
-            </a:pPr>
-            <a:r>
-              <a:rPr lang="en" sz="1200" dirty="0">
-                <a:solidFill>
-                  <a:schemeClr val="bg1"/>
-                </a:solidFill>
-                <a:latin typeface="Calibri" panose="020F0502020204030204" pitchFamily="34" charset="0"/>
-                <a:cs typeface="Calibri" panose="020F0502020204030204" pitchFamily="34" charset="0"/>
-              </a:rPr>
-              <a:t>Repo</a:t>
-            </a:r>
-            <a:endParaRPr sz="1200" dirty="0">
-              <a:solidFill>
-                <a:schemeClr val="bg1"/>
-              </a:solidFill>
-              <a:latin typeface="Calibri" panose="020F0502020204030204" pitchFamily="34" charset="0"/>
-              <a:cs typeface="Calibri" panose="020F0502020204030204" pitchFamily="34" charset="0"/>
-            </a:endParaRPr>
           </a:p>
         </p:txBody>
       </p:sp>
       <p:cxnSp>
         <p:nvCxnSpPr>
-          <p:cNvPr id="10" name="Straight Arrow Connector 9">
+          <p:cNvPr id="15" name="Straight Arrow Connector 14">
             <a:extLst>
               <a:ext uri="{FF2B5EF4-FFF2-40B4-BE49-F238E27FC236}">
-                <a16:creationId xmlns:a16="http://schemas.microsoft.com/office/drawing/2014/main" id="{BEF284E5-2141-2645-9263-76DDEA89D627}"/>
+                <a16:creationId xmlns:a16="http://schemas.microsoft.com/office/drawing/2014/main" id="{3C152D43-C96F-3A7B-DD29-FE559F2D2E79}"/>
               </a:ext>
             </a:extLst>
           </p:cNvPr>
           <p:cNvCxnSpPr>
-            <a:stCxn id="13" idx="3"/>
-            <a:endCxn id="94" idx="0"/>
+            <a:cxnSpLocks/>
+            <a:endCxn id="14" idx="0"/>
           </p:cNvCxnSpPr>
           <p:nvPr/>
         </p:nvCxnSpPr>
         <p:spPr>
           <a:xfrm>
-            <a:off x="6299344" y="1622099"/>
-            <a:ext cx="0" cy="361658"/>
+            <a:off x="2852649" y="1002167"/>
+            <a:ext cx="0" cy="1048751"/>
           </a:xfrm>
           <a:prstGeom prst="straightConnector1">
             <a:avLst/>
           </a:prstGeom>
-          <a:ln>
+          <a:ln w="19050">
+            <a:solidFill>
+              <a:srgbClr val="6A99D0"/>
+            </a:solidFill>
             <a:tailEnd type="triangle"/>
           </a:ln>
         </p:spPr>
@@ -11551,28 +11157,32 @@
       </p:cxnSp>
       <p:cxnSp>
         <p:nvCxnSpPr>
-          <p:cNvPr id="4" name="Elbow Connector 3">
+          <p:cNvPr id="16" name="Straight Arrow Connector 15">
             <a:extLst>
               <a:ext uri="{FF2B5EF4-FFF2-40B4-BE49-F238E27FC236}">
-                <a16:creationId xmlns:a16="http://schemas.microsoft.com/office/drawing/2014/main" id="{B77E2DC3-8896-A944-AF2F-9F9E4B4576C1}"/>
+                <a16:creationId xmlns:a16="http://schemas.microsoft.com/office/drawing/2014/main" id="{3C3BE4B3-4FB8-C294-5543-E564D884E06E}"/>
               </a:ext>
             </a:extLst>
           </p:cNvPr>
           <p:cNvCxnSpPr>
-            <a:stCxn id="91" idx="0"/>
-            <a:endCxn id="13" idx="2"/>
+            <a:cxnSpLocks/>
+            <a:endCxn id="9" idx="0"/>
           </p:cNvCxnSpPr>
           <p:nvPr/>
         </p:nvCxnSpPr>
         <p:spPr>
-          <a:xfrm rot="5400000" flipH="1" flipV="1">
-            <a:off x="4342271" y="442432"/>
-            <a:ext cx="739359" cy="2343293"/>
+          <a:xfrm>
+            <a:off x="6059381" y="1002167"/>
+            <a:ext cx="0" cy="1048752"/>
           </a:xfrm>
-          <a:prstGeom prst="bentConnector2">
+          <a:prstGeom prst="straightConnector1">
             <a:avLst/>
           </a:prstGeom>
-          <a:ln>
+          <a:ln w="19050">
+            <a:solidFill>
+              <a:srgbClr val="6A99D0"/>
+            </a:solidFill>
+            <a:prstDash val="solid"/>
             <a:tailEnd type="triangle"/>
           </a:ln>
         </p:spPr>
@@ -11593,131 +11203,130 @@
       </p:cxnSp>
       <p:sp>
         <p:nvSpPr>
-          <p:cNvPr id="17" name="TextBox 16">
+          <p:cNvPr id="20" name="Rounded Rectangle 19">
             <a:extLst>
               <a:ext uri="{FF2B5EF4-FFF2-40B4-BE49-F238E27FC236}">
-                <a16:creationId xmlns:a16="http://schemas.microsoft.com/office/drawing/2014/main" id="{ED56DA91-F74E-D441-8A3B-EB7FBEFD07FB}"/>
+                <a16:creationId xmlns:a16="http://schemas.microsoft.com/office/drawing/2014/main" id="{D35EE114-ED26-98F2-9D39-6457820E4BF8}"/>
               </a:ext>
             </a:extLst>
           </p:cNvPr>
-          <p:cNvSpPr txBox="1"/>
+          <p:cNvSpPr/>
           <p:nvPr/>
         </p:nvSpPr>
         <p:spPr>
           <a:xfrm>
-            <a:off x="5464019" y="0"/>
-            <a:ext cx="1670650" cy="461665"/>
+            <a:off x="1493341" y="980297"/>
+            <a:ext cx="5925347" cy="743179"/>
           </a:xfrm>
-          <a:prstGeom prst="rect">
-            <a:avLst/>
+          <a:prstGeom prst="roundRect">
+            <a:avLst>
+              <a:gd name="adj" fmla="val 11093"/>
+            </a:avLst>
           </a:prstGeom>
-          <a:noFill/>
-        </p:spPr>
-        <p:txBody>
-          <a:bodyPr wrap="none" rtlCol="0" anchor="ctr">
-            <a:spAutoFit/>
-          </a:bodyPr>
-          <a:lstStyle/>
-          <a:p>
-            <a:pPr algn="ctr"/>
-            <a:r>
-              <a:rPr lang="en-US" sz="1200" i="1" dirty="0">
-                <a:latin typeface="Calibri" panose="020F0502020204030204" pitchFamily="34" charset="0"/>
-                <a:cs typeface="Calibri" panose="020F0502020204030204" pitchFamily="34" charset="0"/>
-              </a:rPr>
-              <a:t>Operators </a:t>
-            </a:r>
-          </a:p>
-          <a:p>
-            <a:pPr algn="ctr"/>
-            <a:r>
-              <a:rPr lang="en-US" sz="1200" i="1" dirty="0">
-                <a:latin typeface="Calibri" panose="020F0502020204030204" pitchFamily="34" charset="0"/>
-                <a:cs typeface="Calibri" panose="020F0502020204030204" pitchFamily="34" charset="0"/>
-              </a:rPr>
-              <a:t>(Configuration-as-Code)</a:t>
-            </a:r>
-          </a:p>
-        </p:txBody>
-      </p:sp>
-      <p:cxnSp>
-        <p:nvCxnSpPr>
-          <p:cNvPr id="19" name="Straight Arrow Connector 18">
-            <a:extLst>
-              <a:ext uri="{FF2B5EF4-FFF2-40B4-BE49-F238E27FC236}">
-                <a16:creationId xmlns:a16="http://schemas.microsoft.com/office/drawing/2014/main" id="{CDF47E2C-5573-2841-AF1A-6C488CDDB1A8}"/>
-              </a:ext>
-            </a:extLst>
-          </p:cNvPr>
-          <p:cNvCxnSpPr>
-            <a:cxnSpLocks/>
-            <a:stCxn id="17" idx="2"/>
-            <a:endCxn id="13" idx="1"/>
-          </p:cNvCxnSpPr>
-          <p:nvPr/>
-        </p:nvCxnSpPr>
-        <p:spPr>
-          <a:xfrm>
-            <a:off x="6299344" y="461665"/>
-            <a:ext cx="0" cy="405032"/>
-          </a:xfrm>
-          <a:prstGeom prst="straightConnector1">
-            <a:avLst/>
-          </a:prstGeom>
+          <a:solidFill>
+            <a:schemeClr val="accent1">
+              <a:lumMod val="20000"/>
+              <a:lumOff val="80000"/>
+            </a:schemeClr>
+          </a:solidFill>
           <a:ln>
-            <a:tailEnd type="triangle"/>
+            <a:solidFill>
+              <a:srgbClr val="C2D6EC"/>
+            </a:solidFill>
           </a:ln>
         </p:spPr>
         <p:style>
           <a:lnRef idx="1">
             <a:schemeClr val="accent1"/>
           </a:lnRef>
-          <a:fillRef idx="0">
+          <a:fillRef idx="2">
             <a:schemeClr val="accent1"/>
           </a:fillRef>
-          <a:effectRef idx="0">
+          <a:effectRef idx="1">
             <a:schemeClr val="accent1"/>
           </a:effectRef>
           <a:fontRef idx="minor">
-            <a:schemeClr val="tx1"/>
+            <a:schemeClr val="dk1"/>
           </a:fontRef>
         </p:style>
-      </p:cxnSp>
+        <p:txBody>
+          <a:bodyPr rtlCol="0" anchor="ctr"/>
+          <a:lstStyle/>
+          <a:p>
+            <a:pPr algn="ctr"/>
+            <a:r>
+              <a:rPr lang="en-US" sz="1600" dirty="0">
+                <a:latin typeface="Calibri" panose="020F0502020204030204" pitchFamily="34" charset="0"/>
+                <a:cs typeface="Calibri" panose="020F0502020204030204" pitchFamily="34" charset="0"/>
+              </a:rPr>
+              <a:t>Infrastructure-as-Code</a:t>
+            </a:r>
+          </a:p>
+          <a:p>
+            <a:pPr algn="ctr"/>
+            <a:r>
+              <a:rPr lang="en-US" sz="1600" dirty="0">
+                <a:latin typeface="Calibri" panose="020F0502020204030204" pitchFamily="34" charset="0"/>
+                <a:cs typeface="Calibri" panose="020F0502020204030204" pitchFamily="34" charset="0"/>
+              </a:rPr>
+              <a:t>(Terraform)</a:t>
+            </a:r>
+          </a:p>
+        </p:txBody>
+      </p:sp>
       <p:sp>
         <p:nvSpPr>
-          <p:cNvPr id="6" name="TextBox 5">
+          <p:cNvPr id="21" name="Rounded Rectangle 20">
             <a:extLst>
               <a:ext uri="{FF2B5EF4-FFF2-40B4-BE49-F238E27FC236}">
-                <a16:creationId xmlns:a16="http://schemas.microsoft.com/office/drawing/2014/main" id="{B3E23762-41F0-A5C0-AA20-928C04575C4E}"/>
+                <a16:creationId xmlns:a16="http://schemas.microsoft.com/office/drawing/2014/main" id="{6BC03806-8D7E-E5B0-9855-5B466E8A27B8}"/>
               </a:ext>
             </a:extLst>
           </p:cNvPr>
-          <p:cNvSpPr txBox="1"/>
+          <p:cNvSpPr/>
           <p:nvPr/>
         </p:nvSpPr>
         <p:spPr>
           <a:xfrm>
-            <a:off x="439275" y="2222957"/>
-            <a:ext cx="873957" cy="276999"/>
+            <a:off x="4700074" y="2054859"/>
+            <a:ext cx="2718614" cy="320597"/>
           </a:xfrm>
-          <a:prstGeom prst="rect">
+          <a:prstGeom prst="roundRect">
             <a:avLst/>
           </a:prstGeom>
-          <a:noFill/>
+          <a:ln w="19050">
+            <a:noFill/>
+            <a:prstDash val="sysDash"/>
+          </a:ln>
         </p:spPr>
+        <p:style>
+          <a:lnRef idx="3">
+            <a:schemeClr val="lt1"/>
+          </a:lnRef>
+          <a:fillRef idx="1">
+            <a:schemeClr val="accent1"/>
+          </a:fillRef>
+          <a:effectRef idx="1">
+            <a:schemeClr val="accent1"/>
+          </a:effectRef>
+          <a:fontRef idx="minor">
+            <a:schemeClr val="lt1"/>
+          </a:fontRef>
+        </p:style>
         <p:txBody>
-          <a:bodyPr wrap="none" rtlCol="0" anchor="ctr">
-            <a:spAutoFit/>
-          </a:bodyPr>
+          <a:bodyPr rtlCol="0" anchor="ctr"/>
           <a:lstStyle/>
           <a:p>
             <a:pPr algn="ctr"/>
             <a:r>
-              <a:rPr lang="en-US" sz="1200" i="1" dirty="0">
+              <a:rPr lang="en-US" dirty="0">
+                <a:solidFill>
+                  <a:schemeClr val="bg1"/>
+                </a:solidFill>
                 <a:latin typeface="Calibri" panose="020F0502020204030204" pitchFamily="34" charset="0"/>
                 <a:cs typeface="Calibri" panose="020F0502020204030204" pitchFamily="34" charset="0"/>
               </a:rPr>
-              <a:t>Developers</a:t>
+              <a:t>Provisioning API</a:t>
             </a:r>
           </a:p>
         </p:txBody>
@@ -26394,8 +26003,8 @@
         </p:nvSpPr>
         <p:spPr>
           <a:xfrm>
-            <a:off x="2112210" y="1132124"/>
-            <a:ext cx="4301067" cy="675001"/>
+            <a:off x="2112210" y="881178"/>
+            <a:ext cx="4301067" cy="925948"/>
           </a:xfrm>
           <a:prstGeom prst="roundRect">
             <a:avLst/>
@@ -26443,6 +26052,18 @@
               <a:t>Runtime Control</a:t>
             </a:r>
           </a:p>
+          <a:p>
+            <a:pPr algn="ctr">
+              <a:lnSpc>
+                <a:spcPct val="90000"/>
+              </a:lnSpc>
+            </a:pPr>
+            <a:endParaRPr lang="en-US" sz="800" dirty="0">
+              <a:latin typeface="Calibri" charset="0"/>
+              <a:ea typeface="Calibri" charset="0"/>
+              <a:cs typeface="Calibri" charset="0"/>
+            </a:endParaRPr>
+          </a:p>
         </p:txBody>
       </p:sp>
       <p:cxnSp>
@@ -26463,8 +26084,8 @@
         </p:nvCxnSpPr>
         <p:spPr>
           <a:xfrm flipH="1">
-            <a:off x="2533294" y="1807125"/>
-            <a:ext cx="1729450" cy="452721"/>
+            <a:off x="2533294" y="1807126"/>
+            <a:ext cx="1729450" cy="452720"/>
           </a:xfrm>
           <a:prstGeom prst="straightConnector1">
             <a:avLst/>
@@ -26507,8 +26128,8 @@
         </p:nvCxnSpPr>
         <p:spPr>
           <a:xfrm flipH="1">
-            <a:off x="3507528" y="1807125"/>
-            <a:ext cx="755216" cy="453809"/>
+            <a:off x="3507528" y="1807126"/>
+            <a:ext cx="755216" cy="453808"/>
           </a:xfrm>
           <a:prstGeom prst="straightConnector1">
             <a:avLst/>
@@ -26551,8 +26172,8 @@
         </p:nvCxnSpPr>
         <p:spPr>
           <a:xfrm>
-            <a:off x="4262744" y="1807125"/>
-            <a:ext cx="229352" cy="452721"/>
+            <a:off x="4262744" y="1807126"/>
+            <a:ext cx="229352" cy="452720"/>
           </a:xfrm>
           <a:prstGeom prst="straightConnector1">
             <a:avLst/>
@@ -26595,8 +26216,8 @@
         </p:nvCxnSpPr>
         <p:spPr>
           <a:xfrm>
-            <a:off x="4262744" y="1807125"/>
-            <a:ext cx="1731052" cy="453088"/>
+            <a:off x="4262744" y="1807126"/>
+            <a:ext cx="1731052" cy="453087"/>
           </a:xfrm>
           <a:prstGeom prst="straightConnector1">
             <a:avLst/>
@@ -26764,7 +26385,7 @@
         </p:nvSpPr>
         <p:spPr>
           <a:xfrm>
-            <a:off x="2096927" y="554268"/>
+            <a:off x="2096926" y="380955"/>
             <a:ext cx="4331635" cy="276999"/>
           </a:xfrm>
           <a:prstGeom prst="rect">
@@ -26807,8 +26428,8 @@
         </p:nvCxnSpPr>
         <p:spPr>
           <a:xfrm flipH="1">
-            <a:off x="4262743" y="831267"/>
-            <a:ext cx="2" cy="368765"/>
+            <a:off x="4262743" y="657954"/>
+            <a:ext cx="1" cy="305407"/>
           </a:xfrm>
           <a:prstGeom prst="straightConnector1">
             <a:avLst/>
@@ -26849,7 +26470,7 @@
         </p:nvSpPr>
         <p:spPr>
           <a:xfrm>
-            <a:off x="2203173" y="1200032"/>
+            <a:off x="2203173" y="963361"/>
             <a:ext cx="4119140" cy="218327"/>
           </a:xfrm>
           <a:prstGeom prst="roundRect">
@@ -26949,6 +26570,120 @@
           </a:fontRef>
         </p:style>
       </p:cxnSp>
+      <p:sp>
+        <p:nvSpPr>
+          <p:cNvPr id="7" name="Can 6">
+            <a:extLst>
+              <a:ext uri="{FF2B5EF4-FFF2-40B4-BE49-F238E27FC236}">
+                <a16:creationId xmlns:a16="http://schemas.microsoft.com/office/drawing/2014/main" id="{46B4C416-A274-B463-E83D-770BA2D05C9A}"/>
+              </a:ext>
+            </a:extLst>
+          </p:cNvPr>
+          <p:cNvSpPr/>
+          <p:nvPr/>
+        </p:nvSpPr>
+        <p:spPr>
+          <a:xfrm>
+            <a:off x="5776411" y="1274066"/>
+            <a:ext cx="434766" cy="441063"/>
+          </a:xfrm>
+          <a:prstGeom prst="can">
+            <a:avLst/>
+          </a:prstGeom>
+          <a:solidFill>
+            <a:srgbClr val="6A99D0"/>
+          </a:solidFill>
+        </p:spPr>
+        <p:style>
+          <a:lnRef idx="2">
+            <a:schemeClr val="accent1">
+              <a:shade val="50000"/>
+            </a:schemeClr>
+          </a:lnRef>
+          <a:fillRef idx="1">
+            <a:schemeClr val="accent1"/>
+          </a:fillRef>
+          <a:effectRef idx="0">
+            <a:schemeClr val="accent1"/>
+          </a:effectRef>
+          <a:fontRef idx="minor">
+            <a:schemeClr val="lt1"/>
+          </a:fontRef>
+        </p:style>
+        <p:txBody>
+          <a:bodyPr rtlCol="0" anchor="ctr"/>
+          <a:lstStyle/>
+          <a:p>
+            <a:pPr algn="ctr"/>
+            <a:r>
+              <a:rPr lang="en-US" sz="1200" dirty="0">
+                <a:latin typeface="Calibri" panose="020F0502020204030204" pitchFamily="34" charset="0"/>
+                <a:cs typeface="Calibri" panose="020F0502020204030204" pitchFamily="34" charset="0"/>
+              </a:rPr>
+              <a:t>K/V</a:t>
+            </a:r>
+          </a:p>
+        </p:txBody>
+      </p:sp>
+      <p:sp>
+        <p:nvSpPr>
+          <p:cNvPr id="2" name="Oval 1">
+            <a:extLst>
+              <a:ext uri="{FF2B5EF4-FFF2-40B4-BE49-F238E27FC236}">
+                <a16:creationId xmlns:a16="http://schemas.microsoft.com/office/drawing/2014/main" id="{EA12A306-8FF0-A52D-05A2-D9FD8F008F46}"/>
+              </a:ext>
+            </a:extLst>
+          </p:cNvPr>
+          <p:cNvSpPr/>
+          <p:nvPr/>
+        </p:nvSpPr>
+        <p:spPr>
+          <a:xfrm>
+            <a:off x="2299062" y="1279495"/>
+            <a:ext cx="852930" cy="393258"/>
+          </a:xfrm>
+          <a:prstGeom prst="ellipse">
+            <a:avLst/>
+          </a:prstGeom>
+          <a:solidFill>
+            <a:srgbClr val="6A99D0"/>
+          </a:solidFill>
+        </p:spPr>
+        <p:style>
+          <a:lnRef idx="2">
+            <a:schemeClr val="accent1">
+              <a:shade val="50000"/>
+            </a:schemeClr>
+          </a:lnRef>
+          <a:fillRef idx="1">
+            <a:schemeClr val="accent1"/>
+          </a:fillRef>
+          <a:effectRef idx="0">
+            <a:schemeClr val="accent1"/>
+          </a:effectRef>
+          <a:fontRef idx="minor">
+            <a:schemeClr val="lt1"/>
+          </a:fontRef>
+        </p:style>
+        <p:txBody>
+          <a:bodyPr rtlCol="0" anchor="ctr"/>
+          <a:lstStyle/>
+          <a:p>
+            <a:pPr algn="ctr">
+              <a:lnSpc>
+                <a:spcPct val="80000"/>
+              </a:lnSpc>
+            </a:pPr>
+            <a:r>
+              <a:rPr lang="en-US" sz="1200" dirty="0">
+                <a:latin typeface="Calibri" panose="020F0502020204030204" pitchFamily="34" charset="0"/>
+                <a:cs typeface="Calibri" panose="020F0502020204030204" pitchFamily="34" charset="0"/>
+              </a:rPr>
+              <a:t>Data Model</a:t>
+            </a:r>
+          </a:p>
+        </p:txBody>
+      </p:sp>
     </p:spTree>
     <p:extLst>
       <p:ext uri="{BB962C8B-B14F-4D97-AF65-F5344CB8AC3E}">

</xml_diff>